<commit_message>
Edit ppt - Timer erläutern
</commit_message>
<xml_diff>
--- a/Buzzer.pptx
+++ b/Buzzer.pptx
@@ -10,9 +10,10 @@
     <p:sldId id="257" r:id="rId4"/>
     <p:sldId id="258" r:id="rId5"/>
     <p:sldId id="259" r:id="rId6"/>
-    <p:sldId id="263" r:id="rId7"/>
-    <p:sldId id="260" r:id="rId8"/>
-    <p:sldId id="262" r:id="rId9"/>
+    <p:sldId id="264" r:id="rId7"/>
+    <p:sldId id="263" r:id="rId8"/>
+    <p:sldId id="260" r:id="rId9"/>
+    <p:sldId id="262" r:id="rId10"/>
   </p:sldIdLst>
   <p:sldSz cx="12192000" cy="6858000"/>
   <p:notesSz cx="6858000" cy="9144000"/>
@@ -111,6 +112,11 @@
       </a:defRPr>
     </a:lvl9pPr>
   </p:defaultTextStyle>
+  <p:extLst>
+    <p:ext uri="{EFAFB233-063F-42B5-8137-9DF3F51BA10A}">
+      <p15:sldGuideLst xmlns:p15="http://schemas.microsoft.com/office/powerpoint/2012/main"/>
+    </p:ext>
+  </p:extLst>
 </p:presentation>
 </file>
 
@@ -860,7 +866,7 @@
             <a:fld id="{B61BEF0D-F0BB-DE4B-95CE-6DB70DBA9567}" type="datetimeFigureOut">
               <a:rPr lang="en-US" dirty="0"/>
               <a:pPr/>
-              <a:t>5/16/2019</a:t>
+              <a:t>5/20/2019</a:t>
             </a:fld>
             <a:endParaRPr lang="en-US" dirty="0"/>
           </a:p>
@@ -1108,7 +1114,7 @@
             <a:fld id="{B61BEF0D-F0BB-DE4B-95CE-6DB70DBA9567}" type="datetimeFigureOut">
               <a:rPr lang="en-US" dirty="0"/>
               <a:pPr/>
-              <a:t>5/16/2019</a:t>
+              <a:t>5/20/2019</a:t>
             </a:fld>
             <a:endParaRPr lang="en-US" dirty="0"/>
           </a:p>
@@ -1419,7 +1425,7 @@
             <a:fld id="{B61BEF0D-F0BB-DE4B-95CE-6DB70DBA9567}" type="datetimeFigureOut">
               <a:rPr lang="en-US" dirty="0"/>
               <a:pPr/>
-              <a:t>5/16/2019</a:t>
+              <a:t>5/20/2019</a:t>
             </a:fld>
             <a:endParaRPr lang="en-US" dirty="0"/>
           </a:p>
@@ -1749,7 +1755,7 @@
             <a:fld id="{B61BEF0D-F0BB-DE4B-95CE-6DB70DBA9567}" type="datetimeFigureOut">
               <a:rPr lang="en-US" dirty="0"/>
               <a:pPr/>
-              <a:t>5/16/2019</a:t>
+              <a:t>5/20/2019</a:t>
             </a:fld>
             <a:endParaRPr lang="en-US" dirty="0"/>
           </a:p>
@@ -2060,7 +2066,7 @@
             <a:fld id="{B61BEF0D-F0BB-DE4B-95CE-6DB70DBA9567}" type="datetimeFigureOut">
               <a:rPr lang="en-US" dirty="0"/>
               <a:pPr/>
-              <a:t>5/16/2019</a:t>
+              <a:t>5/20/2019</a:t>
             </a:fld>
             <a:endParaRPr lang="en-US" dirty="0"/>
           </a:p>
@@ -2450,7 +2456,7 @@
             <a:fld id="{B61BEF0D-F0BB-DE4B-95CE-6DB70DBA9567}" type="datetimeFigureOut">
               <a:rPr lang="en-US" dirty="0"/>
               <a:pPr/>
-              <a:t>5/16/2019</a:t>
+              <a:t>5/20/2019</a:t>
             </a:fld>
             <a:endParaRPr lang="en-US" dirty="0"/>
           </a:p>
@@ -2616,7 +2622,7 @@
           <a:p>
             <a:fld id="{55C6B4A9-1611-4792-9094-5F34BCA07E0B}" type="datetimeFigureOut">
               <a:rPr lang="en-US" dirty="0"/>
-              <a:t>5/16/2019</a:t>
+              <a:t>5/20/2019</a:t>
             </a:fld>
             <a:endParaRPr lang="en-US" dirty="0"/>
           </a:p>
@@ -2792,7 +2798,7 @@
             <a:fld id="{B61BEF0D-F0BB-DE4B-95CE-6DB70DBA9567}" type="datetimeFigureOut">
               <a:rPr lang="en-US" dirty="0"/>
               <a:pPr/>
-              <a:t>5/16/2019</a:t>
+              <a:t>5/20/2019</a:t>
             </a:fld>
             <a:endParaRPr lang="en-US" dirty="0"/>
           </a:p>
@@ -2958,7 +2964,7 @@
           <a:p>
             <a:fld id="{42A54C80-263E-416B-A8E0-580EDEADCBDC}" type="datetimeFigureOut">
               <a:rPr lang="en-US" dirty="0"/>
-              <a:t>5/16/2019</a:t>
+              <a:t>5/20/2019</a:t>
             </a:fld>
             <a:endParaRPr lang="en-US" dirty="0"/>
           </a:p>
@@ -3201,7 +3207,7 @@
             <a:fld id="{B61BEF0D-F0BB-DE4B-95CE-6DB70DBA9567}" type="datetimeFigureOut">
               <a:rPr lang="en-US" dirty="0"/>
               <a:pPr/>
-              <a:t>5/16/2019</a:t>
+              <a:t>5/20/2019</a:t>
             </a:fld>
             <a:endParaRPr lang="en-US" dirty="0"/>
           </a:p>
@@ -3429,7 +3435,7 @@
           <a:p>
             <a:fld id="{42A54C80-263E-416B-A8E0-580EDEADCBDC}" type="datetimeFigureOut">
               <a:rPr lang="en-US" dirty="0"/>
-              <a:t>5/16/2019</a:t>
+              <a:t>5/20/2019</a:t>
             </a:fld>
             <a:endParaRPr lang="en-US" dirty="0"/>
           </a:p>
@@ -3799,7 +3805,7 @@
             <a:fld id="{B61BEF0D-F0BB-DE4B-95CE-6DB70DBA9567}" type="datetimeFigureOut">
               <a:rPr lang="en-US" dirty="0"/>
               <a:pPr/>
-              <a:t>5/16/2019</a:t>
+              <a:t>5/20/2019</a:t>
             </a:fld>
             <a:endParaRPr lang="en-US" dirty="0"/>
           </a:p>
@@ -3919,7 +3925,7 @@
             <a:fld id="{B61BEF0D-F0BB-DE4B-95CE-6DB70DBA9567}" type="datetimeFigureOut">
               <a:rPr lang="en-US" dirty="0"/>
               <a:pPr/>
-              <a:t>5/16/2019</a:t>
+              <a:t>5/20/2019</a:t>
             </a:fld>
             <a:endParaRPr lang="en-US" dirty="0"/>
           </a:p>
@@ -4011,7 +4017,7 @@
             <a:fld id="{B61BEF0D-F0BB-DE4B-95CE-6DB70DBA9567}" type="datetimeFigureOut">
               <a:rPr lang="en-US" dirty="0"/>
               <a:pPr/>
-              <a:t>5/16/2019</a:t>
+              <a:t>5/20/2019</a:t>
             </a:fld>
             <a:endParaRPr lang="en-US" dirty="0"/>
           </a:p>
@@ -4262,7 +4268,7 @@
           <a:p>
             <a:fld id="{42A54C80-263E-416B-A8E0-580EDEADCBDC}" type="datetimeFigureOut">
               <a:rPr lang="en-US" dirty="0"/>
-              <a:t>5/16/2019</a:t>
+              <a:t>5/20/2019</a:t>
             </a:fld>
             <a:endParaRPr lang="en-US" dirty="0"/>
           </a:p>
@@ -4564,7 +4570,7 @@
             <a:fld id="{B61BEF0D-F0BB-DE4B-95CE-6DB70DBA9567}" type="datetimeFigureOut">
               <a:rPr lang="en-US" dirty="0"/>
               <a:pPr/>
-              <a:t>5/16/2019</a:t>
+              <a:t>5/20/2019</a:t>
             </a:fld>
             <a:endParaRPr lang="en-US" dirty="0"/>
           </a:p>
@@ -5262,7 +5268,7 @@
             <a:fld id="{B61BEF0D-F0BB-DE4B-95CE-6DB70DBA9567}" type="datetimeFigureOut">
               <a:rPr lang="en-US" dirty="0"/>
               <a:pPr/>
-              <a:t>5/16/2019</a:t>
+              <a:t>5/20/2019</a:t>
             </a:fld>
             <a:endParaRPr lang="en-US" dirty="0"/>
           </a:p>
@@ -6238,6 +6244,14 @@
           <a:bodyPr/>
           <a:lstStyle/>
           <a:p>
+            <a:r>
+              <a:rPr lang="de-DE" dirty="0"/>
+              <a:t>Da </a:t>
+            </a:r>
+            <a:r>
+              <a:rPr lang="de-DE"/>
+              <a:t>den Programablaufplan rein!</a:t>
+            </a:r>
             <a:endParaRPr lang="de-DE" dirty="0"/>
           </a:p>
         </p:txBody>
@@ -6277,7 +6291,7 @@
           <p:cNvPr id="2" name="Titel 1">
             <a:extLst>
               <a:ext uri="{FF2B5EF4-FFF2-40B4-BE49-F238E27FC236}">
-                <a16:creationId xmlns:a16="http://schemas.microsoft.com/office/drawing/2014/main" id="{69462FC5-0605-4F47-A7D6-BE0FC786991C}"/>
+                <a16:creationId xmlns:a16="http://schemas.microsoft.com/office/drawing/2014/main" id="{EBE08393-8DFF-46D0-800D-B5ACD64AF93D}"/>
               </a:ext>
             </a:extLst>
           </p:cNvPr>
@@ -6294,50 +6308,49 @@
           <a:lstStyle/>
           <a:p>
             <a:r>
-              <a:rPr lang="de-DE" dirty="0"/>
-              <a:t>Erweiterungen</a:t>
-            </a:r>
-          </a:p>
-        </p:txBody>
-      </p:sp>
-      <p:sp>
-        <p:nvSpPr>
-          <p:cNvPr id="3" name="Inhaltsplatzhalter 2">
+              <a:rPr lang="de-DE" dirty="0" err="1"/>
+              <a:t>Timer</a:t>
+            </a:r>
+            <a:endParaRPr lang="de-DE" dirty="0"/>
+          </a:p>
+        </p:txBody>
+      </p:sp>
+      <p:pic>
+        <p:nvPicPr>
+          <p:cNvPr id="8" name="Inhaltsplatzhalter 7">
             <a:extLst>
               <a:ext uri="{FF2B5EF4-FFF2-40B4-BE49-F238E27FC236}">
-                <a16:creationId xmlns:a16="http://schemas.microsoft.com/office/drawing/2014/main" id="{8FF5617A-959B-4DAF-AC32-C0A804554E40}"/>
+                <a16:creationId xmlns:a16="http://schemas.microsoft.com/office/drawing/2014/main" id="{38D56769-BEB2-4F74-A468-C61E3E055BCF}"/>
               </a:ext>
             </a:extLst>
           </p:cNvPr>
-          <p:cNvSpPr>
-            <a:spLocks noGrp="1"/>
-          </p:cNvSpPr>
+          <p:cNvPicPr>
+            <a:picLocks noGrp="1" noChangeAspect="1"/>
+          </p:cNvPicPr>
           <p:nvPr>
             <p:ph idx="1"/>
           </p:nvPr>
-        </p:nvSpPr>
-        <p:spPr/>
-        <p:txBody>
-          <a:bodyPr/>
-          <a:lstStyle/>
-          <a:p>
-            <a:r>
-              <a:rPr lang="de-DE" dirty="0"/>
-              <a:t>Zufallsgenerator</a:t>
-            </a:r>
-          </a:p>
-          <a:p>
-            <a:r>
-              <a:rPr lang="de-DE" dirty="0"/>
-              <a:t>Buzzer für andere Funktionen nutzen (auslösen des Lichts auf Signal)</a:t>
-            </a:r>
-          </a:p>
-        </p:txBody>
-      </p:sp>
+        </p:nvPicPr>
+        <p:blipFill>
+          <a:blip r:embed="rId2"/>
+          <a:stretch>
+            <a:fillRect/>
+          </a:stretch>
+        </p:blipFill>
+        <p:spPr>
+          <a:xfrm>
+            <a:off x="677334" y="2830750"/>
+            <a:ext cx="8984642" cy="2249284"/>
+          </a:xfrm>
+          <a:prstGeom prst="rect">
+            <a:avLst/>
+          </a:prstGeom>
+        </p:spPr>
+      </p:pic>
     </p:spTree>
     <p:extLst>
       <p:ext uri="{BB962C8B-B14F-4D97-AF65-F5344CB8AC3E}">
-        <p14:creationId xmlns:p14="http://schemas.microsoft.com/office/powerpoint/2010/main" val="1120401153"/>
+        <p14:creationId xmlns:p14="http://schemas.microsoft.com/office/powerpoint/2010/main" val="2323375115"/>
       </p:ext>
     </p:extLst>
   </p:cSld>
@@ -6369,6 +6382,98 @@
           <p:cNvPr id="2" name="Titel 1">
             <a:extLst>
               <a:ext uri="{FF2B5EF4-FFF2-40B4-BE49-F238E27FC236}">
+                <a16:creationId xmlns:a16="http://schemas.microsoft.com/office/drawing/2014/main" id="{69462FC5-0605-4F47-A7D6-BE0FC786991C}"/>
+              </a:ext>
+            </a:extLst>
+          </p:cNvPr>
+          <p:cNvSpPr>
+            <a:spLocks noGrp="1"/>
+          </p:cNvSpPr>
+          <p:nvPr>
+            <p:ph type="title"/>
+          </p:nvPr>
+        </p:nvSpPr>
+        <p:spPr/>
+        <p:txBody>
+          <a:bodyPr/>
+          <a:lstStyle/>
+          <a:p>
+            <a:r>
+              <a:rPr lang="de-DE" dirty="0"/>
+              <a:t>Erweiterungen</a:t>
+            </a:r>
+          </a:p>
+        </p:txBody>
+      </p:sp>
+      <p:sp>
+        <p:nvSpPr>
+          <p:cNvPr id="3" name="Inhaltsplatzhalter 2">
+            <a:extLst>
+              <a:ext uri="{FF2B5EF4-FFF2-40B4-BE49-F238E27FC236}">
+                <a16:creationId xmlns:a16="http://schemas.microsoft.com/office/drawing/2014/main" id="{8FF5617A-959B-4DAF-AC32-C0A804554E40}"/>
+              </a:ext>
+            </a:extLst>
+          </p:cNvPr>
+          <p:cNvSpPr>
+            <a:spLocks noGrp="1"/>
+          </p:cNvSpPr>
+          <p:nvPr>
+            <p:ph idx="1"/>
+          </p:nvPr>
+        </p:nvSpPr>
+        <p:spPr/>
+        <p:txBody>
+          <a:bodyPr/>
+          <a:lstStyle/>
+          <a:p>
+            <a:r>
+              <a:rPr lang="de-DE" dirty="0"/>
+              <a:t>Zufallsgenerator</a:t>
+            </a:r>
+          </a:p>
+          <a:p>
+            <a:r>
+              <a:rPr lang="de-DE" dirty="0"/>
+              <a:t>Buzzer für andere Funktionen nutzen (auslösen des Lichts auf Signal)</a:t>
+            </a:r>
+          </a:p>
+        </p:txBody>
+      </p:sp>
+    </p:spTree>
+    <p:extLst>
+      <p:ext uri="{BB962C8B-B14F-4D97-AF65-F5344CB8AC3E}">
+        <p14:creationId xmlns:p14="http://schemas.microsoft.com/office/powerpoint/2010/main" val="1120401153"/>
+      </p:ext>
+    </p:extLst>
+  </p:cSld>
+  <p:clrMapOvr>
+    <a:masterClrMapping/>
+  </p:clrMapOvr>
+</p:sld>
+</file>
+
+<file path=ppt/slides/slide8.xml><?xml version="1.0" encoding="utf-8"?>
+<p:sld xmlns:a="http://schemas.openxmlformats.org/drawingml/2006/main" xmlns:r="http://schemas.openxmlformats.org/officeDocument/2006/relationships" xmlns:p="http://schemas.openxmlformats.org/presentationml/2006/main">
+  <p:cSld>
+    <p:spTree>
+      <p:nvGrpSpPr>
+        <p:cNvPr id="1" name=""/>
+        <p:cNvGrpSpPr/>
+        <p:nvPr/>
+      </p:nvGrpSpPr>
+      <p:grpSpPr>
+        <a:xfrm>
+          <a:off x="0" y="0"/>
+          <a:ext cx="0" cy="0"/>
+          <a:chOff x="0" y="0"/>
+          <a:chExt cx="0" cy="0"/>
+        </a:xfrm>
+      </p:grpSpPr>
+      <p:sp>
+        <p:nvSpPr>
+          <p:cNvPr id="2" name="Titel 1">
+            <a:extLst>
+              <a:ext uri="{FF2B5EF4-FFF2-40B4-BE49-F238E27FC236}">
                 <a16:creationId xmlns:a16="http://schemas.microsoft.com/office/drawing/2014/main" id="{61DAFEA5-F63C-40E5-AA3F-5E2BD5D0A05E}"/>
               </a:ext>
             </a:extLst>
@@ -6430,7 +6535,7 @@
 </p:sld>
 </file>
 
-<file path=ppt/slides/slide8.xml><?xml version="1.0" encoding="utf-8"?>
+<file path=ppt/slides/slide9.xml><?xml version="1.0" encoding="utf-8"?>
 <p:sld xmlns:a="http://schemas.openxmlformats.org/drawingml/2006/main" xmlns:r="http://schemas.openxmlformats.org/officeDocument/2006/relationships" xmlns:p="http://schemas.openxmlformats.org/presentationml/2006/main">
   <p:cSld>
     <p:spTree>

</xml_diff>

<commit_message>
Add Gliederung to PP
</commit_message>
<xml_diff>
--- a/Buzzer.pptx
+++ b/Buzzer.pptx
@@ -6,11 +6,11 @@
   </p:sldMasterIdLst>
   <p:sldIdLst>
     <p:sldId id="256" r:id="rId2"/>
-    <p:sldId id="261" r:id="rId3"/>
-    <p:sldId id="257" r:id="rId4"/>
-    <p:sldId id="265" r:id="rId5"/>
-    <p:sldId id="258" r:id="rId6"/>
-    <p:sldId id="259" r:id="rId7"/>
+    <p:sldId id="267" r:id="rId3"/>
+    <p:sldId id="261" r:id="rId4"/>
+    <p:sldId id="257" r:id="rId5"/>
+    <p:sldId id="265" r:id="rId6"/>
+    <p:sldId id="258" r:id="rId7"/>
     <p:sldId id="264" r:id="rId8"/>
     <p:sldId id="263" r:id="rId9"/>
     <p:sldId id="260" r:id="rId10"/>
@@ -7008,7 +7008,7 @@
             <a:fld id="{B61BEF0D-F0BB-DE4B-95CE-6DB70DBA9567}" type="datetimeFigureOut">
               <a:rPr lang="en-US" dirty="0"/>
               <a:pPr/>
-              <a:t>5/22/2019</a:t>
+              <a:t>5/23/2019</a:t>
             </a:fld>
             <a:endParaRPr lang="en-US" dirty="0"/>
           </a:p>
@@ -7256,7 +7256,7 @@
             <a:fld id="{B61BEF0D-F0BB-DE4B-95CE-6DB70DBA9567}" type="datetimeFigureOut">
               <a:rPr lang="en-US" dirty="0"/>
               <a:pPr/>
-              <a:t>5/22/2019</a:t>
+              <a:t>5/23/2019</a:t>
             </a:fld>
             <a:endParaRPr lang="en-US" dirty="0"/>
           </a:p>
@@ -7567,7 +7567,7 @@
             <a:fld id="{B61BEF0D-F0BB-DE4B-95CE-6DB70DBA9567}" type="datetimeFigureOut">
               <a:rPr lang="en-US" dirty="0"/>
               <a:pPr/>
-              <a:t>5/22/2019</a:t>
+              <a:t>5/23/2019</a:t>
             </a:fld>
             <a:endParaRPr lang="en-US" dirty="0"/>
           </a:p>
@@ -7897,7 +7897,7 @@
             <a:fld id="{B61BEF0D-F0BB-DE4B-95CE-6DB70DBA9567}" type="datetimeFigureOut">
               <a:rPr lang="en-US" dirty="0"/>
               <a:pPr/>
-              <a:t>5/22/2019</a:t>
+              <a:t>5/23/2019</a:t>
             </a:fld>
             <a:endParaRPr lang="en-US" dirty="0"/>
           </a:p>
@@ -8208,7 +8208,7 @@
             <a:fld id="{B61BEF0D-F0BB-DE4B-95CE-6DB70DBA9567}" type="datetimeFigureOut">
               <a:rPr lang="en-US" dirty="0"/>
               <a:pPr/>
-              <a:t>5/22/2019</a:t>
+              <a:t>5/23/2019</a:t>
             </a:fld>
             <a:endParaRPr lang="en-US" dirty="0"/>
           </a:p>
@@ -8598,7 +8598,7 @@
             <a:fld id="{B61BEF0D-F0BB-DE4B-95CE-6DB70DBA9567}" type="datetimeFigureOut">
               <a:rPr lang="en-US" dirty="0"/>
               <a:pPr/>
-              <a:t>5/22/2019</a:t>
+              <a:t>5/23/2019</a:t>
             </a:fld>
             <a:endParaRPr lang="en-US" dirty="0"/>
           </a:p>
@@ -8764,7 +8764,7 @@
           <a:p>
             <a:fld id="{55C6B4A9-1611-4792-9094-5F34BCA07E0B}" type="datetimeFigureOut">
               <a:rPr lang="en-US" dirty="0"/>
-              <a:t>5/22/2019</a:t>
+              <a:t>5/23/2019</a:t>
             </a:fld>
             <a:endParaRPr lang="en-US" dirty="0"/>
           </a:p>
@@ -8940,7 +8940,7 @@
             <a:fld id="{B61BEF0D-F0BB-DE4B-95CE-6DB70DBA9567}" type="datetimeFigureOut">
               <a:rPr lang="en-US" dirty="0"/>
               <a:pPr/>
-              <a:t>5/22/2019</a:t>
+              <a:t>5/23/2019</a:t>
             </a:fld>
             <a:endParaRPr lang="en-US" dirty="0"/>
           </a:p>
@@ -9106,7 +9106,7 @@
           <a:p>
             <a:fld id="{42A54C80-263E-416B-A8E0-580EDEADCBDC}" type="datetimeFigureOut">
               <a:rPr lang="en-US" dirty="0"/>
-              <a:t>5/22/2019</a:t>
+              <a:t>5/23/2019</a:t>
             </a:fld>
             <a:endParaRPr lang="en-US" dirty="0"/>
           </a:p>
@@ -9349,7 +9349,7 @@
             <a:fld id="{B61BEF0D-F0BB-DE4B-95CE-6DB70DBA9567}" type="datetimeFigureOut">
               <a:rPr lang="en-US" dirty="0"/>
               <a:pPr/>
-              <a:t>5/22/2019</a:t>
+              <a:t>5/23/2019</a:t>
             </a:fld>
             <a:endParaRPr lang="en-US" dirty="0"/>
           </a:p>
@@ -9577,7 +9577,7 @@
           <a:p>
             <a:fld id="{42A54C80-263E-416B-A8E0-580EDEADCBDC}" type="datetimeFigureOut">
               <a:rPr lang="en-US" dirty="0"/>
-              <a:t>5/22/2019</a:t>
+              <a:t>5/23/2019</a:t>
             </a:fld>
             <a:endParaRPr lang="en-US" dirty="0"/>
           </a:p>
@@ -9947,7 +9947,7 @@
             <a:fld id="{B61BEF0D-F0BB-DE4B-95CE-6DB70DBA9567}" type="datetimeFigureOut">
               <a:rPr lang="en-US" dirty="0"/>
               <a:pPr/>
-              <a:t>5/22/2019</a:t>
+              <a:t>5/23/2019</a:t>
             </a:fld>
             <a:endParaRPr lang="en-US" dirty="0"/>
           </a:p>
@@ -10067,7 +10067,7 @@
             <a:fld id="{B61BEF0D-F0BB-DE4B-95CE-6DB70DBA9567}" type="datetimeFigureOut">
               <a:rPr lang="en-US" dirty="0"/>
               <a:pPr/>
-              <a:t>5/22/2019</a:t>
+              <a:t>5/23/2019</a:t>
             </a:fld>
             <a:endParaRPr lang="en-US" dirty="0"/>
           </a:p>
@@ -10159,7 +10159,7 @@
             <a:fld id="{B61BEF0D-F0BB-DE4B-95CE-6DB70DBA9567}" type="datetimeFigureOut">
               <a:rPr lang="en-US" dirty="0"/>
               <a:pPr/>
-              <a:t>5/22/2019</a:t>
+              <a:t>5/23/2019</a:t>
             </a:fld>
             <a:endParaRPr lang="en-US" dirty="0"/>
           </a:p>
@@ -10410,7 +10410,7 @@
           <a:p>
             <a:fld id="{42A54C80-263E-416B-A8E0-580EDEADCBDC}" type="datetimeFigureOut">
               <a:rPr lang="en-US" dirty="0"/>
-              <a:t>5/22/2019</a:t>
+              <a:t>5/23/2019</a:t>
             </a:fld>
             <a:endParaRPr lang="en-US" dirty="0"/>
           </a:p>
@@ -10712,7 +10712,7 @@
             <a:fld id="{B61BEF0D-F0BB-DE4B-95CE-6DB70DBA9567}" type="datetimeFigureOut">
               <a:rPr lang="en-US" dirty="0"/>
               <a:pPr/>
-              <a:t>5/22/2019</a:t>
+              <a:t>5/23/2019</a:t>
             </a:fld>
             <a:endParaRPr lang="en-US" dirty="0"/>
           </a:p>
@@ -11410,7 +11410,7 @@
             <a:fld id="{B61BEF0D-F0BB-DE4B-95CE-6DB70DBA9567}" type="datetimeFigureOut">
               <a:rPr lang="en-US" dirty="0"/>
               <a:pPr/>
-              <a:t>5/22/2019</a:t>
+              <a:t>5/23/2019</a:t>
             </a:fld>
             <a:endParaRPr lang="en-US" dirty="0"/>
           </a:p>
@@ -13496,6 +13496,125 @@
           <p:cNvPr id="2" name="Titel 1">
             <a:extLst>
               <a:ext uri="{FF2B5EF4-FFF2-40B4-BE49-F238E27FC236}">
+                <a16:creationId xmlns:a16="http://schemas.microsoft.com/office/drawing/2014/main" id="{A20E3600-0CC7-4A8A-BD99-672B09B62F8B}"/>
+              </a:ext>
+            </a:extLst>
+          </p:cNvPr>
+          <p:cNvSpPr>
+            <a:spLocks noGrp="1"/>
+          </p:cNvSpPr>
+          <p:nvPr>
+            <p:ph type="title"/>
+          </p:nvPr>
+        </p:nvSpPr>
+        <p:spPr/>
+        <p:txBody>
+          <a:bodyPr/>
+          <a:lstStyle/>
+          <a:p>
+            <a:r>
+              <a:rPr lang="de-DE" dirty="0"/>
+              <a:t>Gliederung</a:t>
+            </a:r>
+          </a:p>
+        </p:txBody>
+      </p:sp>
+      <p:sp>
+        <p:nvSpPr>
+          <p:cNvPr id="3" name="Inhaltsplatzhalter 2">
+            <a:extLst>
+              <a:ext uri="{FF2B5EF4-FFF2-40B4-BE49-F238E27FC236}">
+                <a16:creationId xmlns:a16="http://schemas.microsoft.com/office/drawing/2014/main" id="{F25C54C1-CC1A-4D6A-B562-960826C69663}"/>
+              </a:ext>
+            </a:extLst>
+          </p:cNvPr>
+          <p:cNvSpPr>
+            <a:spLocks noGrp="1"/>
+          </p:cNvSpPr>
+          <p:nvPr>
+            <p:ph idx="1"/>
+          </p:nvPr>
+        </p:nvSpPr>
+        <p:spPr/>
+        <p:txBody>
+          <a:bodyPr/>
+          <a:lstStyle/>
+          <a:p>
+            <a:r>
+              <a:rPr lang="de-DE" dirty="0"/>
+              <a:t>Gruppe</a:t>
+            </a:r>
+          </a:p>
+          <a:p>
+            <a:r>
+              <a:rPr lang="de-DE" dirty="0"/>
+              <a:t>Programmidee</a:t>
+            </a:r>
+          </a:p>
+          <a:p>
+            <a:r>
+              <a:rPr lang="de-DE" dirty="0"/>
+              <a:t>Benötigte Komponenten</a:t>
+            </a:r>
+          </a:p>
+          <a:p>
+            <a:r>
+              <a:rPr lang="de-DE" dirty="0"/>
+              <a:t>Programmablauf</a:t>
+            </a:r>
+          </a:p>
+          <a:p>
+            <a:r>
+              <a:rPr lang="de-DE" dirty="0"/>
+              <a:t>Implementation</a:t>
+            </a:r>
+          </a:p>
+          <a:p>
+            <a:r>
+              <a:rPr lang="de-DE" dirty="0"/>
+              <a:t>Demo</a:t>
+            </a:r>
+          </a:p>
+          <a:p>
+            <a:endParaRPr lang="de-DE" dirty="0"/>
+          </a:p>
+        </p:txBody>
+      </p:sp>
+    </p:spTree>
+    <p:extLst>
+      <p:ext uri="{BB962C8B-B14F-4D97-AF65-F5344CB8AC3E}">
+        <p14:creationId xmlns:p14="http://schemas.microsoft.com/office/powerpoint/2010/main" val="3085125523"/>
+      </p:ext>
+    </p:extLst>
+  </p:cSld>
+  <p:clrMapOvr>
+    <a:masterClrMapping/>
+  </p:clrMapOvr>
+</p:sld>
+</file>
+
+<file path=ppt/slides/slide3.xml><?xml version="1.0" encoding="utf-8"?>
+<p:sld xmlns:a="http://schemas.openxmlformats.org/drawingml/2006/main" xmlns:r="http://schemas.openxmlformats.org/officeDocument/2006/relationships" xmlns:p="http://schemas.openxmlformats.org/presentationml/2006/main">
+  <p:cSld>
+    <p:spTree>
+      <p:nvGrpSpPr>
+        <p:cNvPr id="1" name=""/>
+        <p:cNvGrpSpPr/>
+        <p:nvPr/>
+      </p:nvGrpSpPr>
+      <p:grpSpPr>
+        <a:xfrm>
+          <a:off x="0" y="0"/>
+          <a:ext cx="0" cy="0"/>
+          <a:chOff x="0" y="0"/>
+          <a:chExt cx="0" cy="0"/>
+        </a:xfrm>
+      </p:grpSpPr>
+      <p:sp>
+        <p:nvSpPr>
+          <p:cNvPr id="2" name="Titel 1">
+            <a:extLst>
+              <a:ext uri="{FF2B5EF4-FFF2-40B4-BE49-F238E27FC236}">
                 <a16:creationId xmlns:a16="http://schemas.microsoft.com/office/drawing/2014/main" id="{CB459021-F0D9-4DC1-9B8C-AF5D492861D1}"/>
               </a:ext>
             </a:extLst>
@@ -13593,7 +13712,7 @@
 </p:sld>
 </file>
 
-<file path=ppt/slides/slide3.xml><?xml version="1.0" encoding="utf-8"?>
+<file path=ppt/slides/slide4.xml><?xml version="1.0" encoding="utf-8"?>
 <p:sld xmlns:a="http://schemas.openxmlformats.org/drawingml/2006/main" xmlns:r="http://schemas.openxmlformats.org/officeDocument/2006/relationships" xmlns:p="http://schemas.openxmlformats.org/presentationml/2006/main">
   <p:cSld>
     <p:spTree>
@@ -13702,7 +13821,7 @@
 </p:sld>
 </file>
 
-<file path=ppt/slides/slide4.xml><?xml version="1.0" encoding="utf-8"?>
+<file path=ppt/slides/slide5.xml><?xml version="1.0" encoding="utf-8"?>
 <p:sld xmlns:a="http://schemas.openxmlformats.org/drawingml/2006/main" xmlns:r="http://schemas.openxmlformats.org/officeDocument/2006/relationships" xmlns:p="http://schemas.openxmlformats.org/presentationml/2006/main">
   <p:cSld>
     <p:bg>
@@ -13806,7 +13925,7 @@
 </p:sld>
 </file>
 
-<file path=ppt/slides/slide5.xml><?xml version="1.0" encoding="utf-8"?>
+<file path=ppt/slides/slide6.xml><?xml version="1.0" encoding="utf-8"?>
 <p:sld xmlns:a="http://schemas.openxmlformats.org/drawingml/2006/main" xmlns:r="http://schemas.openxmlformats.org/officeDocument/2006/relationships" xmlns:p="http://schemas.openxmlformats.org/presentationml/2006/main">
   <p:cSld>
     <p:bg>
@@ -13910,97 +14029,6 @@
 </p:sld>
 </file>
 
-<file path=ppt/slides/slide6.xml><?xml version="1.0" encoding="utf-8"?>
-<p:sld xmlns:a="http://schemas.openxmlformats.org/drawingml/2006/main" xmlns:r="http://schemas.openxmlformats.org/officeDocument/2006/relationships" xmlns:p="http://schemas.openxmlformats.org/presentationml/2006/main">
-  <p:cSld>
-    <p:spTree>
-      <p:nvGrpSpPr>
-        <p:cNvPr id="1" name=""/>
-        <p:cNvGrpSpPr/>
-        <p:nvPr/>
-      </p:nvGrpSpPr>
-      <p:grpSpPr>
-        <a:xfrm>
-          <a:off x="0" y="0"/>
-          <a:ext cx="0" cy="0"/>
-          <a:chOff x="0" y="0"/>
-          <a:chExt cx="0" cy="0"/>
-        </a:xfrm>
-      </p:grpSpPr>
-      <p:sp>
-        <p:nvSpPr>
-          <p:cNvPr id="2" name="Titel 1">
-            <a:extLst>
-              <a:ext uri="{FF2B5EF4-FFF2-40B4-BE49-F238E27FC236}">
-                <a16:creationId xmlns:a16="http://schemas.microsoft.com/office/drawing/2014/main" id="{CA3CF05D-5B71-46BD-A40A-23C5B67842A7}"/>
-              </a:ext>
-            </a:extLst>
-          </p:cNvPr>
-          <p:cNvSpPr>
-            <a:spLocks noGrp="1"/>
-          </p:cNvSpPr>
-          <p:nvPr>
-            <p:ph type="title"/>
-          </p:nvPr>
-        </p:nvSpPr>
-        <p:spPr/>
-        <p:txBody>
-          <a:bodyPr/>
-          <a:lstStyle/>
-          <a:p>
-            <a:r>
-              <a:rPr lang="de-DE" dirty="0"/>
-              <a:t>Implementation</a:t>
-            </a:r>
-          </a:p>
-        </p:txBody>
-      </p:sp>
-      <p:sp>
-        <p:nvSpPr>
-          <p:cNvPr id="3" name="Inhaltsplatzhalter 2">
-            <a:extLst>
-              <a:ext uri="{FF2B5EF4-FFF2-40B4-BE49-F238E27FC236}">
-                <a16:creationId xmlns:a16="http://schemas.microsoft.com/office/drawing/2014/main" id="{1D2B9752-3F58-4CFA-9DFF-8BCB50D44982}"/>
-              </a:ext>
-            </a:extLst>
-          </p:cNvPr>
-          <p:cNvSpPr>
-            <a:spLocks noGrp="1"/>
-          </p:cNvSpPr>
-          <p:nvPr>
-            <p:ph idx="1"/>
-          </p:nvPr>
-        </p:nvSpPr>
-        <p:spPr/>
-        <p:txBody>
-          <a:bodyPr/>
-          <a:lstStyle/>
-          <a:p>
-            <a:r>
-              <a:rPr lang="de-DE" dirty="0"/>
-              <a:t>Da </a:t>
-            </a:r>
-            <a:r>
-              <a:rPr lang="de-DE"/>
-              <a:t>den Programablaufplan rein!</a:t>
-            </a:r>
-            <a:endParaRPr lang="de-DE" dirty="0"/>
-          </a:p>
-        </p:txBody>
-      </p:sp>
-    </p:spTree>
-    <p:extLst>
-      <p:ext uri="{BB962C8B-B14F-4D97-AF65-F5344CB8AC3E}">
-        <p14:creationId xmlns:p14="http://schemas.microsoft.com/office/powerpoint/2010/main" val="1782705226"/>
-      </p:ext>
-    </p:extLst>
-  </p:cSld>
-  <p:clrMapOvr>
-    <a:masterClrMapping/>
-  </p:clrMapOvr>
-</p:sld>
-</file>
-
 <file path=ppt/slides/slide7.xml><?xml version="1.0" encoding="utf-8"?>
 <p:sld xmlns:a="http://schemas.openxmlformats.org/drawingml/2006/main" xmlns:r="http://schemas.openxmlformats.org/officeDocument/2006/relationships" xmlns:p="http://schemas.openxmlformats.org/presentationml/2006/main">
   <p:cSld>
@@ -14040,6 +14068,39 @@
           <a:lstStyle/>
           <a:p>
             <a:r>
+              <a:rPr lang="de-DE" dirty="0"/>
+              <a:t>Implementation</a:t>
+            </a:r>
+          </a:p>
+        </p:txBody>
+      </p:sp>
+      <p:sp>
+        <p:nvSpPr>
+          <p:cNvPr id="4" name="Inhaltsplatzhalter 3">
+            <a:extLst>
+              <a:ext uri="{FF2B5EF4-FFF2-40B4-BE49-F238E27FC236}">
+                <a16:creationId xmlns:a16="http://schemas.microsoft.com/office/drawing/2014/main" id="{40A506D3-087F-4317-A2F1-F990949B5EBD}"/>
+              </a:ext>
+            </a:extLst>
+          </p:cNvPr>
+          <p:cNvSpPr>
+            <a:spLocks noGrp="1"/>
+          </p:cNvSpPr>
+          <p:nvPr>
+            <p:ph idx="1"/>
+          </p:nvPr>
+        </p:nvSpPr>
+        <p:spPr>
+          <a:xfrm>
+            <a:off x="677334" y="2160590"/>
+            <a:ext cx="8596668" cy="488826"/>
+          </a:xfrm>
+        </p:spPr>
+        <p:txBody>
+          <a:bodyPr/>
+          <a:lstStyle/>
+          <a:p>
+            <a:r>
               <a:rPr lang="de-DE" dirty="0" err="1"/>
               <a:t>Timer</a:t>
             </a:r>
@@ -14049,19 +14110,17 @@
       </p:sp>
       <p:pic>
         <p:nvPicPr>
-          <p:cNvPr id="8" name="Inhaltsplatzhalter 7">
+          <p:cNvPr id="6" name="Inhaltsplatzhalter 7">
             <a:extLst>
               <a:ext uri="{FF2B5EF4-FFF2-40B4-BE49-F238E27FC236}">
-                <a16:creationId xmlns:a16="http://schemas.microsoft.com/office/drawing/2014/main" id="{38D56769-BEB2-4F74-A468-C61E3E055BCF}"/>
+                <a16:creationId xmlns:a16="http://schemas.microsoft.com/office/drawing/2014/main" id="{5D772CD7-920F-410B-9329-F54FBB510B4B}"/>
               </a:ext>
             </a:extLst>
           </p:cNvPr>
           <p:cNvPicPr>
-            <a:picLocks noGrp="1" noChangeAspect="1"/>
+            <a:picLocks noChangeAspect="1"/>
           </p:cNvPicPr>
-          <p:nvPr>
-            <p:ph idx="1"/>
-          </p:nvPr>
+          <p:nvPr/>
         </p:nvPicPr>
         <p:blipFill>
           <a:blip r:embed="rId2"/>

</xml_diff>